<commit_message>
2022.07.26.화  내용 1차 수정
</commit_message>
<xml_diff>
--- a/반야불교대학 2022.0726.pptx
+++ b/반야불교대학 2022.0726.pptx
@@ -4428,7 +4428,7 @@
               <a:t>불교사</a:t>
             </a:r>
             <a:r>
-              <a:rPr lang="en-US" altLang="ko-KR" sz="1000" dirty="0">
+              <a:rPr lang="en-US" altLang="ko-KR" sz="1000" dirty="0" smtClean="0">
                 <a:solidFill>
                   <a:schemeClr val="tx1"/>
                 </a:solidFill>
@@ -4438,17 +4438,17 @@
               <a:t>, </a:t>
             </a:r>
             <a:r>
-              <a:rPr lang="ko-KR" altLang="en-US" sz="1000" dirty="0">
-                <a:solidFill>
-                  <a:schemeClr val="tx1"/>
-                </a:solidFill>
-                <a:latin typeface="석보체 가는(OTF)" panose="02020603020101020101" pitchFamily="18" charset="-127"/>
-                <a:ea typeface="석보체 가는(OTF)" panose="02020603020101020101" pitchFamily="18" charset="-127"/>
-              </a:rPr>
-              <a:t>불자와 인공지능</a:t>
-            </a:r>
-            <a:r>
-              <a:rPr lang="en-US" altLang="ko-KR" sz="1000" dirty="0">
+              <a:rPr lang="ko-KR" altLang="en-US" sz="1000" dirty="0" smtClean="0">
+                <a:solidFill>
+                  <a:schemeClr val="tx1"/>
+                </a:solidFill>
+                <a:latin typeface="석보체 가는(OTF)" panose="02020603020101020101" pitchFamily="18" charset="-127"/>
+                <a:ea typeface="석보체 가는(OTF)" panose="02020603020101020101" pitchFamily="18" charset="-127"/>
+              </a:rPr>
+              <a:t>불교 문화</a:t>
+            </a:r>
+            <a:r>
+              <a:rPr lang="en-US" altLang="ko-KR" sz="1000" dirty="0" smtClean="0">
                 <a:solidFill>
                   <a:schemeClr val="tx1"/>
                 </a:solidFill>
@@ -4458,14 +4458,14 @@
               <a:t>, </a:t>
             </a:r>
             <a:r>
-              <a:rPr lang="ko-KR" altLang="en-US" sz="1000" dirty="0">
-                <a:solidFill>
-                  <a:schemeClr val="tx1"/>
-                </a:solidFill>
-                <a:latin typeface="석보체 가는(OTF)" panose="02020603020101020101" pitchFamily="18" charset="-127"/>
-                <a:ea typeface="석보체 가는(OTF)" panose="02020603020101020101" pitchFamily="18" charset="-127"/>
-              </a:rPr>
-              <a:t>불교문화경전</a:t>
+              <a:rPr lang="ko-KR" altLang="en-US" sz="1000" dirty="0" smtClean="0">
+                <a:solidFill>
+                  <a:schemeClr val="tx1"/>
+                </a:solidFill>
+                <a:latin typeface="석보체 가는(OTF)" panose="02020603020101020101" pitchFamily="18" charset="-127"/>
+                <a:ea typeface="석보체 가는(OTF)" panose="02020603020101020101" pitchFamily="18" charset="-127"/>
+              </a:rPr>
+              <a:t>경전</a:t>
             </a:r>
             <a:r>
               <a:rPr lang="en-US" altLang="ko-KR" sz="1000" dirty="0">
@@ -4713,7 +4713,7 @@
               <a:t>, </a:t>
             </a:r>
             <a:r>
-              <a:rPr lang="ko-KR" altLang="en-US" sz="1000" dirty="0" err="1">
+              <a:rPr lang="ko-KR" altLang="en-US" sz="1000" dirty="0" err="1" smtClean="0">
                 <a:solidFill>
                   <a:schemeClr val="tx1"/>
                 </a:solidFill>
@@ -4721,6 +4721,46 @@
                 <a:ea typeface="석보체 가는(OTF)" panose="02020603020101020101" pitchFamily="18" charset="-127"/>
               </a:rPr>
               <a:t>금강경</a:t>
+            </a:r>
+            <a:r>
+              <a:rPr lang="ko-KR" altLang="en-US" sz="1000" dirty="0" smtClean="0">
+                <a:solidFill>
+                  <a:schemeClr val="tx1"/>
+                </a:solidFill>
+                <a:latin typeface="석보체 가는(OTF)" panose="02020603020101020101" pitchFamily="18" charset="-127"/>
+                <a:ea typeface="석보체 가는(OTF)" panose="02020603020101020101" pitchFamily="18" charset="-127"/>
+              </a:rPr>
+              <a:t> </a:t>
+            </a:r>
+            <a:r>
+              <a:rPr lang="ko-KR" altLang="en-US" sz="1000" dirty="0" err="1" smtClean="0">
+                <a:solidFill>
+                  <a:schemeClr val="tx1"/>
+                </a:solidFill>
+                <a:latin typeface="석보체 가는(OTF)" panose="02020603020101020101" pitchFamily="18" charset="-127"/>
+                <a:ea typeface="석보체 가는(OTF)" panose="02020603020101020101" pitchFamily="18" charset="-127"/>
+              </a:rPr>
+              <a:t>오가해</a:t>
+            </a:r>
+            <a:r>
+              <a:rPr lang="en-US" altLang="ko-KR" sz="1000" dirty="0" smtClean="0">
+                <a:solidFill>
+                  <a:schemeClr val="tx1"/>
+                </a:solidFill>
+                <a:latin typeface="석보체 가는(OTF)" panose="02020603020101020101" pitchFamily="18" charset="-127"/>
+                <a:ea typeface="석보체 가는(OTF)" panose="02020603020101020101" pitchFamily="18" charset="-127"/>
+              </a:rPr>
+              <a:t>, </a:t>
+            </a:r>
+            <a:r>
+              <a:rPr lang="ko-KR" altLang="en-US" sz="1000" dirty="0" smtClean="0">
+                <a:solidFill>
+                  <a:schemeClr val="tx1"/>
+                </a:solidFill>
+                <a:latin typeface="석보체 가는(OTF)" panose="02020603020101020101" pitchFamily="18" charset="-127"/>
+                <a:ea typeface="석보체 가는(OTF)" panose="02020603020101020101" pitchFamily="18" charset="-127"/>
+              </a:rPr>
+              <a:t>법화경</a:t>
             </a:r>
             <a:endParaRPr lang="en-US" altLang="ko-KR" sz="1000" dirty="0">
               <a:solidFill>
@@ -6108,17 +6148,17 @@
               <a:t>만원 수업료 </a:t>
             </a:r>
             <a:r>
-              <a:rPr lang="en-US" altLang="ko-KR" sz="1200" dirty="0">
-                <a:solidFill>
-                  <a:schemeClr val="tx1"/>
-                </a:solidFill>
-                <a:latin typeface="석보체 가는(OTF)" panose="02020603020101020101" pitchFamily="18" charset="-127"/>
-                <a:ea typeface="석보체 가는(OTF)" panose="02020603020101020101" pitchFamily="18" charset="-127"/>
-              </a:rPr>
-              <a:t>20</a:t>
-            </a:r>
-            <a:r>
-              <a:rPr lang="ko-KR" altLang="en-US" sz="1200" dirty="0">
+              <a:rPr lang="en-US" altLang="ko-KR" sz="1200" dirty="0" smtClean="0">
+                <a:solidFill>
+                  <a:schemeClr val="tx1"/>
+                </a:solidFill>
+                <a:latin typeface="석보체 가는(OTF)" panose="02020603020101020101" pitchFamily="18" charset="-127"/>
+                <a:ea typeface="석보체 가는(OTF)" panose="02020603020101020101" pitchFamily="18" charset="-127"/>
+              </a:rPr>
+              <a:t>15</a:t>
+            </a:r>
+            <a:r>
+              <a:rPr lang="ko-KR" altLang="en-US" sz="1200" dirty="0" smtClean="0">
                 <a:solidFill>
                   <a:schemeClr val="tx1"/>
                 </a:solidFill>
@@ -6776,10 +6816,10 @@
                 <a:latin typeface="HY궁서" panose="02030600000101010101" pitchFamily="18" charset="-127"/>
                 <a:ea typeface="HY궁서" panose="02030600000101010101" pitchFamily="18" charset="-127"/>
               </a:rPr>
-              <a:t>3</a:t>
-            </a:r>
-            <a:r>
-              <a:rPr lang="ko-KR" altLang="en-US" dirty="0">
+              <a:t>9</a:t>
+            </a:r>
+            <a:r>
+              <a:rPr lang="ko-KR" altLang="en-US" dirty="0" smtClean="0">
                 <a:effectLst>
                   <a:glow rad="63500">
                     <a:schemeClr val="accent1">
@@ -6794,7 +6834,7 @@
               <a:t>월 </a:t>
             </a:r>
             <a:r>
-              <a:rPr lang="en-US" altLang="ko-KR" dirty="0">
+              <a:rPr lang="en-US" altLang="ko-KR" dirty="0" smtClean="0">
                 <a:effectLst>
                   <a:glow rad="63500">
                     <a:schemeClr val="accent1">
@@ -6806,10 +6846,10 @@
                 <a:latin typeface="HY궁서" panose="02030600000101010101" pitchFamily="18" charset="-127"/>
                 <a:ea typeface="HY궁서" panose="02030600000101010101" pitchFamily="18" charset="-127"/>
               </a:rPr>
-              <a:t>6</a:t>
-            </a:r>
-            <a:r>
-              <a:rPr lang="ko-KR" altLang="en-US" dirty="0">
+              <a:t>4</a:t>
+            </a:r>
+            <a:r>
+              <a:rPr lang="ko-KR" altLang="en-US" dirty="0" smtClean="0">
                 <a:effectLst>
                   <a:glow rad="63500">
                     <a:schemeClr val="accent1">

</xml_diff>